<commit_message>
Missing slide Cross Validation and Conclusion slides
</commit_message>
<xml_diff>
--- a/Case Study 2.pptx
+++ b/Case Study 2.pptx
@@ -5,7 +5,7 @@
     <p:sldMasterId id="2147483990" r:id="rId1"/>
   </p:sldMasterIdLst>
   <p:notesMasterIdLst>
-    <p:notesMasterId r:id="rId16"/>
+    <p:notesMasterId r:id="rId14"/>
   </p:notesMasterIdLst>
   <p:sldIdLst>
     <p:sldId id="256" r:id="rId2"/>
@@ -18,10 +18,8 @@
     <p:sldId id="281" r:id="rId9"/>
     <p:sldId id="282" r:id="rId10"/>
     <p:sldId id="284" r:id="rId11"/>
-    <p:sldId id="289" r:id="rId12"/>
-    <p:sldId id="290" r:id="rId13"/>
-    <p:sldId id="285" r:id="rId14"/>
-    <p:sldId id="278" r:id="rId15"/>
+    <p:sldId id="290" r:id="rId12"/>
+    <p:sldId id="278" r:id="rId13"/>
   </p:sldIdLst>
   <p:sldSz cx="12192000" cy="6858000"/>
   <p:notesSz cx="6858000" cy="9144000"/>
@@ -123,11 +121,6 @@
   <p:extLst>
     <p:ext uri="{EFAFB233-063F-42B5-8137-9DF3F51BA10A}">
       <p15:sldGuideLst xmlns:p15="http://schemas.microsoft.com/office/powerpoint/2012/main">
-        <p15:guide id="1" orient="horz" pos="2184" userDrawn="1">
-          <p15:clr>
-            <a:srgbClr val="A4A3A4"/>
-          </p15:clr>
-        </p15:guide>
         <p15:guide id="2" pos="3816" userDrawn="1">
           <p15:clr>
             <a:srgbClr val="A4A3A4"/>
@@ -12238,14 +12231,14 @@
           <p:nvPr>
             <p:extLst>
               <p:ext uri="{D42A27DB-BD31-4B8C-83A1-F6EECF244321}">
-                <p14:modId xmlns:p14="http://schemas.microsoft.com/office/powerpoint/2010/main" val="2918131971"/>
+                <p14:modId xmlns:p14="http://schemas.microsoft.com/office/powerpoint/2010/main" val="2213959340"/>
               </p:ext>
             </p:extLst>
           </p:nvPr>
         </p:nvGraphicFramePr>
         <p:xfrm>
-          <a:off x="2454384" y="2856503"/>
-          <a:ext cx="3381521" cy="3383280"/>
+          <a:off x="1724919" y="2874732"/>
+          <a:ext cx="3262718" cy="3383280"/>
         </p:xfrm>
         <a:graphic>
           <a:graphicData uri="http://schemas.openxmlformats.org/drawingml/2006/table">
@@ -12254,21 +12247,21 @@
                 <a:tableStyleId>{68D230F3-CF80-4859-8CE7-A43EE81993B5}</a:tableStyleId>
               </a:tblPr>
               <a:tblGrid>
-                <a:gridCol w="1763898">
+                <a:gridCol w="1701927">
                   <a:extLst>
                     <a:ext uri="{9D8B030D-6E8A-4147-A177-3AD203B41FA5}">
                       <a16:colId xmlns:a16="http://schemas.microsoft.com/office/drawing/2014/main" val="2140873009"/>
                     </a:ext>
                   </a:extLst>
                 </a:gridCol>
-                <a:gridCol w="709286">
+                <a:gridCol w="684367">
                   <a:extLst>
                     <a:ext uri="{9D8B030D-6E8A-4147-A177-3AD203B41FA5}">
                       <a16:colId xmlns:a16="http://schemas.microsoft.com/office/drawing/2014/main" val="421182900"/>
                     </a:ext>
                   </a:extLst>
                 </a:gridCol>
-                <a:gridCol w="908337">
+                <a:gridCol w="876424">
                   <a:extLst>
                     <a:ext uri="{9D8B030D-6E8A-4147-A177-3AD203B41FA5}">
                       <a16:colId xmlns:a16="http://schemas.microsoft.com/office/drawing/2014/main" val="2135523426"/>
@@ -12822,12 +12815,12 @@
                     <a:p>
                       <a:pPr algn="ctr" fontAlgn="b"/>
                       <a:r>
-                        <a:rPr lang="en-US" sz="1000" u="none" strike="noStrike">
+                        <a:rPr lang="en-US" sz="1000" u="none" strike="noStrike" dirty="0">
                           <a:effectLst/>
                         </a:rPr>
                         <a:t>4.23E-05</a:t>
                       </a:r>
-                      <a:endParaRPr lang="en-US" sz="1000" b="0" i="0" u="none" strike="noStrike">
+                      <a:endParaRPr lang="en-US" sz="1000" b="0" i="0" u="none" strike="noStrike" dirty="0">
                         <a:solidFill>
                           <a:srgbClr val="000000"/>
                         </a:solidFill>
@@ -13753,14 +13746,14 @@
           <p:nvPr>
             <p:extLst>
               <p:ext uri="{D42A27DB-BD31-4B8C-83A1-F6EECF244321}">
-                <p14:modId xmlns:p14="http://schemas.microsoft.com/office/powerpoint/2010/main" val="969735119"/>
+                <p14:modId xmlns:p14="http://schemas.microsoft.com/office/powerpoint/2010/main" val="2778913089"/>
               </p:ext>
             </p:extLst>
           </p:nvPr>
         </p:nvGraphicFramePr>
         <p:xfrm>
-          <a:off x="6297671" y="2860744"/>
-          <a:ext cx="3505567" cy="3383280"/>
+          <a:off x="5294600" y="2868655"/>
+          <a:ext cx="3505567" cy="3420293"/>
         </p:xfrm>
         <a:graphic>
           <a:graphicData uri="http://schemas.openxmlformats.org/drawingml/2006/table">
@@ -14371,7 +14364,7 @@
                   </a:ext>
                 </a:extLst>
               </a:tr>
-              <a:tr h="182880">
+              <a:tr h="219893">
                 <a:tc>
                   <a:txBody>
                     <a:bodyPr/>
@@ -15279,8 +15272,8 @@
         </p:nvSpPr>
         <p:spPr>
           <a:xfrm rot="5400000">
-            <a:off x="6004684" y="-1064870"/>
-            <a:ext cx="248244" cy="7348846"/>
+            <a:off x="5160296" y="-919139"/>
+            <a:ext cx="248244" cy="7118999"/>
           </a:xfrm>
           <a:prstGeom prst="leftBrace">
             <a:avLst/>
@@ -15323,8 +15316,8 @@
         </p:nvSpPr>
         <p:spPr>
           <a:xfrm>
-            <a:off x="3886512" y="1706021"/>
-            <a:ext cx="4484587" cy="646331"/>
+            <a:off x="2947303" y="1876338"/>
+            <a:ext cx="4484587" cy="584775"/>
           </a:xfrm>
           <a:prstGeom prst="rect">
             <a:avLst/>
@@ -15341,10 +15334,21 @@
             <a:r>
               <a:rPr lang="en-US" b="1" dirty="0">
                 <a:solidFill>
-                  <a:schemeClr val="accent6"/>
+                  <a:schemeClr val="accent2"/>
                 </a:solidFill>
               </a:rPr>
-              <a:t>Final Reduced LRA Model to determine attrition probability for employees</a:t>
+              <a:t>Final Attrition Model</a:t>
+            </a:r>
+          </a:p>
+          <a:p>
+            <a:pPr algn="ctr"/>
+            <a:r>
+              <a:rPr lang="en-US" sz="1400" dirty="0">
+                <a:solidFill>
+                  <a:schemeClr val="accent2"/>
+                </a:solidFill>
+              </a:rPr>
+              <a:t>Reduced LRA Model</a:t>
             </a:r>
           </a:p>
         </p:txBody>
@@ -15363,7 +15367,7 @@
         </p:nvCxnSpPr>
         <p:spPr>
           <a:xfrm>
-            <a:off x="2172580" y="3211616"/>
+            <a:off x="1526937" y="3211616"/>
             <a:ext cx="0" cy="2924313"/>
           </a:xfrm>
           <a:prstGeom prst="straightConnector1">
@@ -15405,8 +15409,8 @@
         </p:nvSpPr>
         <p:spPr>
           <a:xfrm>
-            <a:off x="159227" y="3778583"/>
-            <a:ext cx="1926739" cy="1169551"/>
+            <a:off x="159228" y="3778583"/>
+            <a:ext cx="1321230" cy="1600438"/>
           </a:xfrm>
           <a:prstGeom prst="rect">
             <a:avLst/>
@@ -15445,7 +15449,7 @@
         </p:nvCxnSpPr>
         <p:spPr>
           <a:xfrm>
-            <a:off x="6099690" y="3211616"/>
+            <a:off x="5128415" y="3176615"/>
             <a:ext cx="0" cy="2924313"/>
           </a:xfrm>
           <a:prstGeom prst="straightConnector1">
@@ -15473,6 +15477,172 @@
           </a:fontRef>
         </p:style>
       </p:cxnSp>
+      <p:sp>
+        <p:nvSpPr>
+          <p:cNvPr id="12" name="TextBox 11">
+            <a:extLst>
+              <a:ext uri="{FF2B5EF4-FFF2-40B4-BE49-F238E27FC236}">
+                <a16:creationId xmlns:a16="http://schemas.microsoft.com/office/drawing/2014/main" id="{E7503BC8-4E44-4542-BECE-65E7E5E0628A}"/>
+              </a:ext>
+            </a:extLst>
+          </p:cNvPr>
+          <p:cNvSpPr txBox="1"/>
+          <p:nvPr/>
+        </p:nvSpPr>
+        <p:spPr>
+          <a:xfrm>
+            <a:off x="8966351" y="3840558"/>
+            <a:ext cx="2798347" cy="2092881"/>
+          </a:xfrm>
+          <a:prstGeom prst="rect">
+            <a:avLst/>
+          </a:prstGeom>
+          <a:noFill/>
+        </p:spPr>
+        <p:txBody>
+          <a:bodyPr wrap="square" rtlCol="0">
+            <a:spAutoFit/>
+          </a:bodyPr>
+          <a:lstStyle/>
+          <a:p>
+            <a:pPr marL="91440" indent="-91440">
+              <a:spcAft>
+                <a:spcPts val="600"/>
+              </a:spcAft>
+              <a:buClr>
+                <a:schemeClr val="accent2"/>
+              </a:buClr>
+              <a:buFont typeface="Arial" panose="020B0604020202020204" pitchFamily="34" charset="0"/>
+              <a:buChar char="•"/>
+            </a:pPr>
+            <a:r>
+              <a:rPr lang="en-US" sz="1200" dirty="0"/>
+              <a:t>The lower the probability of a variable within the model, the higher statistically significant the variable is, in the context of the model</a:t>
+            </a:r>
+          </a:p>
+          <a:p>
+            <a:pPr marL="91440" indent="-91440">
+              <a:spcAft>
+                <a:spcPts val="600"/>
+              </a:spcAft>
+              <a:buClr>
+                <a:schemeClr val="accent2"/>
+              </a:buClr>
+              <a:buFont typeface="Arial" panose="020B0604020202020204" pitchFamily="34" charset="0"/>
+              <a:buChar char="•"/>
+            </a:pPr>
+            <a:r>
+              <a:rPr lang="en-US" sz="1200" dirty="0"/>
+              <a:t>Final Reduced Model AIC is 841, improved from original full model’s AIC of 853</a:t>
+            </a:r>
+          </a:p>
+          <a:p>
+            <a:pPr marL="91440" indent="-91440">
+              <a:spcAft>
+                <a:spcPts val="600"/>
+              </a:spcAft>
+              <a:buClr>
+                <a:schemeClr val="accent2"/>
+              </a:buClr>
+              <a:buFont typeface="Arial" panose="020B0604020202020204" pitchFamily="34" charset="0"/>
+              <a:buChar char="•"/>
+            </a:pPr>
+            <a:r>
+              <a:rPr lang="en-US" sz="1200" dirty="0"/>
+              <a:t>The model was created based on a ‘training’ data split. Cross validation was performed on the ‘testing’ data split</a:t>
+            </a:r>
+          </a:p>
+        </p:txBody>
+      </p:sp>
+      <p:sp>
+        <p:nvSpPr>
+          <p:cNvPr id="13" name="Rectangle 12">
+            <a:extLst>
+              <a:ext uri="{FF2B5EF4-FFF2-40B4-BE49-F238E27FC236}">
+                <a16:creationId xmlns:a16="http://schemas.microsoft.com/office/drawing/2014/main" id="{074FFA7C-7A71-454F-8D4E-A7087F7A779F}"/>
+              </a:ext>
+            </a:extLst>
+          </p:cNvPr>
+          <p:cNvSpPr/>
+          <p:nvPr/>
+        </p:nvSpPr>
+        <p:spPr>
+          <a:xfrm>
+            <a:off x="9164402" y="3389783"/>
+            <a:ext cx="2217274" cy="338554"/>
+          </a:xfrm>
+          <a:prstGeom prst="rect">
+            <a:avLst/>
+          </a:prstGeom>
+        </p:spPr>
+        <p:txBody>
+          <a:bodyPr wrap="none">
+            <a:spAutoFit/>
+          </a:bodyPr>
+          <a:lstStyle/>
+          <a:p>
+            <a:r>
+              <a:rPr lang="en-US" sz="1600" b="1" dirty="0">
+                <a:solidFill>
+                  <a:schemeClr val="accent2"/>
+                </a:solidFill>
+              </a:rPr>
+              <a:t>Other Model Insights</a:t>
+            </a:r>
+          </a:p>
+        </p:txBody>
+      </p:sp>
+      <p:sp>
+        <p:nvSpPr>
+          <p:cNvPr id="3" name="Rectangle 2">
+            <a:extLst>
+              <a:ext uri="{FF2B5EF4-FFF2-40B4-BE49-F238E27FC236}">
+                <a16:creationId xmlns:a16="http://schemas.microsoft.com/office/drawing/2014/main" id="{880D4791-1510-43A5-9968-B1A6235EE9D2}"/>
+              </a:ext>
+            </a:extLst>
+          </p:cNvPr>
+          <p:cNvSpPr/>
+          <p:nvPr/>
+        </p:nvSpPr>
+        <p:spPr>
+          <a:xfrm>
+            <a:off x="9067907" y="1632448"/>
+            <a:ext cx="2798347" cy="1384995"/>
+          </a:xfrm>
+          <a:prstGeom prst="rect">
+            <a:avLst/>
+          </a:prstGeom>
+          <a:solidFill>
+            <a:schemeClr val="bg2"/>
+          </a:solidFill>
+          <a:ln>
+            <a:solidFill>
+              <a:schemeClr val="accent6"/>
+            </a:solidFill>
+          </a:ln>
+        </p:spPr>
+        <p:txBody>
+          <a:bodyPr wrap="square">
+            <a:spAutoFit/>
+          </a:bodyPr>
+          <a:lstStyle/>
+          <a:p>
+            <a:pPr algn="ctr">
+              <a:buClr>
+                <a:schemeClr val="accent2"/>
+              </a:buClr>
+            </a:pPr>
+            <a:r>
+              <a:rPr lang="en-US" sz="1400" b="1" dirty="0">
+                <a:solidFill>
+                  <a:schemeClr val="accent6"/>
+                </a:solidFill>
+              </a:rPr>
+              <a:t>With this model, new employees data with respective profile can be introduced and the model will output an attrition probability for each employee </a:t>
+            </a:r>
+          </a:p>
+        </p:txBody>
+      </p:sp>
     </p:spTree>
     <p:extLst>
       <p:ext uri="{BB962C8B-B14F-4D97-AF65-F5344CB8AC3E}">
@@ -15584,6 +15754,60 @@
                                   </p:childTnLst>
                                 </p:cTn>
                               </p:par>
+                              <p:par>
+                                <p:cTn id="11" presetID="1" presetClass="entr" presetSubtype="0" fill="hold" grpId="0" nodeType="withEffect">
+                                  <p:stCondLst>
+                                    <p:cond delay="0"/>
+                                  </p:stCondLst>
+                                  <p:childTnLst>
+                                    <p:set>
+                                      <p:cBhvr>
+                                        <p:cTn id="12" dur="1" fill="hold">
+                                          <p:stCondLst>
+                                            <p:cond delay="0"/>
+                                          </p:stCondLst>
+                                        </p:cTn>
+                                        <p:tgtEl>
+                                          <p:spTgt spid="12"/>
+                                        </p:tgtEl>
+                                        <p:attrNameLst>
+                                          <p:attrName>style.visibility</p:attrName>
+                                        </p:attrNameLst>
+                                      </p:cBhvr>
+                                      <p:to>
+                                        <p:strVal val="visible"/>
+                                      </p:to>
+                                    </p:set>
+                                  </p:childTnLst>
+                                </p:cTn>
+                              </p:par>
+                              <p:par>
+                                <p:cTn id="13" presetID="1" presetClass="entr" presetSubtype="0" fill="hold" grpId="0" nodeType="withEffect">
+                                  <p:stCondLst>
+                                    <p:cond delay="0"/>
+                                  </p:stCondLst>
+                                  <p:childTnLst>
+                                    <p:set>
+                                      <p:cBhvr>
+                                        <p:cTn id="14" dur="1" fill="hold">
+                                          <p:stCondLst>
+                                            <p:cond delay="0"/>
+                                          </p:stCondLst>
+                                        </p:cTn>
+                                        <p:tgtEl>
+                                          <p:spTgt spid="13"/>
+                                        </p:tgtEl>
+                                        <p:attrNameLst>
+                                          <p:attrName>style.visibility</p:attrName>
+                                        </p:attrNameLst>
+                                      </p:cBhvr>
+                                      <p:to>
+                                        <p:strVal val="visible"/>
+                                      </p:to>
+                                    </p:set>
+                                  </p:childTnLst>
+                                </p:cTn>
+                              </p:par>
                             </p:childTnLst>
                           </p:cTn>
                         </p:par>
@@ -15613,95 +15837,14 @@
     </p:tnLst>
     <p:bldLst>
       <p:bldP spid="10" grpId="0"/>
+      <p:bldP spid="12" grpId="0"/>
+      <p:bldP spid="13" grpId="0"/>
     </p:bldLst>
   </p:timing>
 </p:sld>
 </file>
 
 <file path=ppt/slides/slide11.xml><?xml version="1.0" encoding="utf-8"?>
-<p:sld xmlns:a="http://schemas.openxmlformats.org/drawingml/2006/main" xmlns:r="http://schemas.openxmlformats.org/officeDocument/2006/relationships" xmlns:p="http://schemas.openxmlformats.org/presentationml/2006/main">
-  <p:cSld>
-    <p:spTree>
-      <p:nvGrpSpPr>
-        <p:cNvPr id="1" name=""/>
-        <p:cNvGrpSpPr/>
-        <p:nvPr/>
-      </p:nvGrpSpPr>
-      <p:grpSpPr>
-        <a:xfrm>
-          <a:off x="0" y="0"/>
-          <a:ext cx="0" cy="0"/>
-          <a:chOff x="0" y="0"/>
-          <a:chExt cx="0" cy="0"/>
-        </a:xfrm>
-      </p:grpSpPr>
-      <p:sp>
-        <p:nvSpPr>
-          <p:cNvPr id="2" name="Title 1">
-            <a:extLst>
-              <a:ext uri="{FF2B5EF4-FFF2-40B4-BE49-F238E27FC236}">
-                <a16:creationId xmlns:a16="http://schemas.microsoft.com/office/drawing/2014/main" id="{86274AB9-DA7A-4630-B9A6-8B6BB1752342}"/>
-              </a:ext>
-            </a:extLst>
-          </p:cNvPr>
-          <p:cNvSpPr>
-            <a:spLocks noGrp="1"/>
-          </p:cNvSpPr>
-          <p:nvPr>
-            <p:ph type="title"/>
-          </p:nvPr>
-        </p:nvSpPr>
-        <p:spPr/>
-        <p:txBody>
-          <a:bodyPr/>
-          <a:lstStyle/>
-          <a:p>
-            <a:r>
-              <a:rPr lang="en-US" dirty="0"/>
-              <a:t>cross validation results</a:t>
-            </a:r>
-          </a:p>
-        </p:txBody>
-      </p:sp>
-      <p:sp>
-        <p:nvSpPr>
-          <p:cNvPr id="3" name="Text Placeholder 2">
-            <a:extLst>
-              <a:ext uri="{FF2B5EF4-FFF2-40B4-BE49-F238E27FC236}">
-                <a16:creationId xmlns:a16="http://schemas.microsoft.com/office/drawing/2014/main" id="{A05C094E-36BB-4CC7-AA38-D1DD38A69DD8}"/>
-              </a:ext>
-            </a:extLst>
-          </p:cNvPr>
-          <p:cNvSpPr>
-            <a:spLocks noGrp="1"/>
-          </p:cNvSpPr>
-          <p:nvPr>
-            <p:ph type="body" idx="1"/>
-          </p:nvPr>
-        </p:nvSpPr>
-        <p:spPr/>
-        <p:txBody>
-          <a:bodyPr/>
-          <a:lstStyle/>
-          <a:p>
-            <a:endParaRPr lang="en-US"/>
-          </a:p>
-        </p:txBody>
-      </p:sp>
-    </p:spTree>
-    <p:extLst>
-      <p:ext uri="{BB962C8B-B14F-4D97-AF65-F5344CB8AC3E}">
-        <p14:creationId xmlns:p14="http://schemas.microsoft.com/office/powerpoint/2010/main" val="4184466029"/>
-      </p:ext>
-    </p:extLst>
-  </p:cSld>
-  <p:clrMapOvr>
-    <a:masterClrMapping/>
-  </p:clrMapOvr>
-</p:sld>
-</file>
-
-<file path=ppt/slides/slide12.xml><?xml version="1.0" encoding="utf-8"?>
 <p:sld xmlns:a="http://schemas.openxmlformats.org/drawingml/2006/main" xmlns:r="http://schemas.openxmlformats.org/officeDocument/2006/relationships" xmlns:p="http://schemas.openxmlformats.org/presentationml/2006/main">
   <p:cSld>
     <p:spTree>
@@ -15739,7 +15882,10 @@
           <a:bodyPr/>
           <a:lstStyle/>
           <a:p>
-            <a:endParaRPr lang="en-US"/>
+            <a:r>
+              <a:rPr lang="en-US" dirty="0"/>
+              <a:t>Cross validation and model results</a:t>
+            </a:r>
           </a:p>
         </p:txBody>
       </p:sp>
@@ -15756,90 +15902,7 @@
 </p:sld>
 </file>
 
-<file path=ppt/slides/slide13.xml><?xml version="1.0" encoding="utf-8"?>
-<p:sld xmlns:a="http://schemas.openxmlformats.org/drawingml/2006/main" xmlns:r="http://schemas.openxmlformats.org/officeDocument/2006/relationships" xmlns:p="http://schemas.openxmlformats.org/presentationml/2006/main">
-  <p:cSld>
-    <p:spTree>
-      <p:nvGrpSpPr>
-        <p:cNvPr id="1" name=""/>
-        <p:cNvGrpSpPr/>
-        <p:nvPr/>
-      </p:nvGrpSpPr>
-      <p:grpSpPr>
-        <a:xfrm>
-          <a:off x="0" y="0"/>
-          <a:ext cx="0" cy="0"/>
-          <a:chOff x="0" y="0"/>
-          <a:chExt cx="0" cy="0"/>
-        </a:xfrm>
-      </p:grpSpPr>
-      <p:sp>
-        <p:nvSpPr>
-          <p:cNvPr id="2" name="Title 1">
-            <a:extLst>
-              <a:ext uri="{FF2B5EF4-FFF2-40B4-BE49-F238E27FC236}">
-                <a16:creationId xmlns:a16="http://schemas.microsoft.com/office/drawing/2014/main" id="{86274AB9-DA7A-4630-B9A6-8B6BB1752342}"/>
-              </a:ext>
-            </a:extLst>
-          </p:cNvPr>
-          <p:cNvSpPr>
-            <a:spLocks noGrp="1"/>
-          </p:cNvSpPr>
-          <p:nvPr>
-            <p:ph type="title"/>
-          </p:nvPr>
-        </p:nvSpPr>
-        <p:spPr/>
-        <p:txBody>
-          <a:bodyPr/>
-          <a:lstStyle/>
-          <a:p>
-            <a:r>
-              <a:rPr lang="en-US" dirty="0"/>
-              <a:t>appendix</a:t>
-            </a:r>
-          </a:p>
-        </p:txBody>
-      </p:sp>
-      <p:sp>
-        <p:nvSpPr>
-          <p:cNvPr id="3" name="Text Placeholder 2">
-            <a:extLst>
-              <a:ext uri="{FF2B5EF4-FFF2-40B4-BE49-F238E27FC236}">
-                <a16:creationId xmlns:a16="http://schemas.microsoft.com/office/drawing/2014/main" id="{A05C094E-36BB-4CC7-AA38-D1DD38A69DD8}"/>
-              </a:ext>
-            </a:extLst>
-          </p:cNvPr>
-          <p:cNvSpPr>
-            <a:spLocks noGrp="1"/>
-          </p:cNvSpPr>
-          <p:nvPr>
-            <p:ph type="body" idx="1"/>
-          </p:nvPr>
-        </p:nvSpPr>
-        <p:spPr/>
-        <p:txBody>
-          <a:bodyPr/>
-          <a:lstStyle/>
-          <a:p>
-            <a:endParaRPr lang="en-US"/>
-          </a:p>
-        </p:txBody>
-      </p:sp>
-    </p:spTree>
-    <p:extLst>
-      <p:ext uri="{BB962C8B-B14F-4D97-AF65-F5344CB8AC3E}">
-        <p14:creationId xmlns:p14="http://schemas.microsoft.com/office/powerpoint/2010/main" val="2574946965"/>
-      </p:ext>
-    </p:extLst>
-  </p:cSld>
-  <p:clrMapOvr>
-    <a:masterClrMapping/>
-  </p:clrMapOvr>
-</p:sld>
-</file>
-
-<file path=ppt/slides/slide14.xml><?xml version="1.0" encoding="utf-8"?>
+<file path=ppt/slides/slide12.xml><?xml version="1.0" encoding="utf-8"?>
 <p:sld xmlns:a="http://schemas.openxmlformats.org/drawingml/2006/main" xmlns:r="http://schemas.openxmlformats.org/officeDocument/2006/relationships" xmlns:p="http://schemas.openxmlformats.org/presentationml/2006/main">
   <p:cSld>
     <p:spTree>
@@ -15881,7 +15944,7 @@
           <a:p>
             <a:r>
               <a:rPr lang="en-US" dirty="0"/>
-              <a:t>Executive summary</a:t>
+              <a:t>Conclusion and summary</a:t>
             </a:r>
           </a:p>
         </p:txBody>
@@ -15949,6 +16012,46 @@
               <a:t>Analysis Repository</a:t>
             </a:r>
             <a:endParaRPr lang="en-US" dirty="0"/>
+          </a:p>
+        </p:txBody>
+      </p:sp>
+      <p:sp>
+        <p:nvSpPr>
+          <p:cNvPr id="5" name="TextBox 4">
+            <a:extLst>
+              <a:ext uri="{FF2B5EF4-FFF2-40B4-BE49-F238E27FC236}">
+                <a16:creationId xmlns:a16="http://schemas.microsoft.com/office/drawing/2014/main" id="{E1B20BBC-7125-416C-8A90-93B6E5D7B9B9}"/>
+              </a:ext>
+            </a:extLst>
+          </p:cNvPr>
+          <p:cNvSpPr txBox="1"/>
+          <p:nvPr/>
+        </p:nvSpPr>
+        <p:spPr>
+          <a:xfrm rot="20194777">
+            <a:off x="4536558" y="3013501"/>
+            <a:ext cx="3213100" cy="830997"/>
+          </a:xfrm>
+          <a:prstGeom prst="rect">
+            <a:avLst/>
+          </a:prstGeom>
+          <a:noFill/>
+        </p:spPr>
+        <p:txBody>
+          <a:bodyPr wrap="square" rtlCol="0">
+            <a:spAutoFit/>
+          </a:bodyPr>
+          <a:lstStyle/>
+          <a:p>
+            <a:pPr algn="ctr"/>
+            <a:r>
+              <a:rPr lang="en-US" sz="4800" dirty="0">
+                <a:solidFill>
+                  <a:srgbClr val="FF0000"/>
+                </a:solidFill>
+              </a:rPr>
+              <a:t>In Progress</a:t>
+            </a:r>
           </a:p>
         </p:txBody>
       </p:sp>
@@ -16526,7 +16629,7 @@
           <a:p>
             <a:r>
               <a:rPr lang="en-US" dirty="0"/>
-              <a:t>Methodology used to approach attrition</a:t>
+              <a:t>Methodology and framework used to study attrition</a:t>
             </a:r>
           </a:p>
         </p:txBody>
@@ -16612,7 +16715,7 @@
         </p:nvSpPr>
         <p:spPr>
           <a:xfrm>
-            <a:off x="5219246" y="2306921"/>
+            <a:off x="5114243" y="2306921"/>
             <a:ext cx="2053447" cy="400110"/>
           </a:xfrm>
           <a:prstGeom prst="rect">
@@ -19480,7 +19583,7 @@
         </p:nvSpPr>
         <p:spPr>
           <a:xfrm>
-            <a:off x="8670394" y="2271531"/>
+            <a:off x="8670394" y="2264551"/>
             <a:ext cx="3150511" cy="646331"/>
           </a:xfrm>
           <a:prstGeom prst="rect">
@@ -19593,7 +19696,7 @@
         </p:nvSpPr>
         <p:spPr>
           <a:xfrm>
-            <a:off x="8670395" y="1820756"/>
+            <a:off x="8670395" y="1813776"/>
             <a:ext cx="2543838" cy="338554"/>
           </a:xfrm>
           <a:prstGeom prst="rect">
@@ -20271,7 +20374,7 @@
           <a:p>
             <a:r>
               <a:rPr lang="en-US" dirty="0"/>
-              <a:t>Model creation</a:t>
+              <a:t>Model creation and cross validation</a:t>
             </a:r>
           </a:p>
         </p:txBody>
@@ -20356,7 +20459,7 @@
           <a:p>
             <a:r>
               <a:rPr lang="en-US" dirty="0"/>
-              <a:t>model Requirements, evaluation and comparison</a:t>
+              <a:t>model importance, Requirements and model evaluation</a:t>
             </a:r>
           </a:p>
         </p:txBody>
@@ -20378,13 +20481,13 @@
               <p:nvPr>
                 <p:extLst>
                   <p:ext uri="{D42A27DB-BD31-4B8C-83A1-F6EECF244321}">
-                    <p14:modId xmlns:p14="http://schemas.microsoft.com/office/powerpoint/2010/main" val="505360017"/>
+                    <p14:modId xmlns:p14="http://schemas.microsoft.com/office/powerpoint/2010/main" val="1640153713"/>
                   </p:ext>
                 </p:extLst>
               </p:nvPr>
             </p:nvGraphicFramePr>
             <p:xfrm>
-              <a:off x="1076258" y="3784058"/>
+              <a:off x="1038161" y="3862736"/>
               <a:ext cx="10039483" cy="2338687"/>
             </p:xfrm>
             <a:graphic>
@@ -21341,7 +21444,7 @@
                       </a:ext>
                     </a:extLst>
                   </a:tr>
-                  <a:tr h="330893">
+                  <a:tr h="302690">
                     <a:tc>
                       <a:txBody>
                         <a:bodyPr/>
@@ -21577,13 +21680,13 @@
               <p:nvPr>
                 <p:extLst>
                   <p:ext uri="{D42A27DB-BD31-4B8C-83A1-F6EECF244321}">
-                    <p14:modId xmlns:p14="http://schemas.microsoft.com/office/powerpoint/2010/main" val="505360017"/>
+                    <p14:modId xmlns:p14="http://schemas.microsoft.com/office/powerpoint/2010/main" val="1640153713"/>
                   </p:ext>
                 </p:extLst>
               </p:nvPr>
             </p:nvGraphicFramePr>
             <p:xfrm>
-              <a:off x="1076258" y="3784058"/>
+              <a:off x="1038161" y="3862736"/>
               <a:ext cx="10039483" cy="2338687"/>
             </p:xfrm>
             <a:graphic>
@@ -22731,7 +22834,7 @@
         </p:nvSpPr>
         <p:spPr>
           <a:xfrm>
-            <a:off x="385763" y="6343650"/>
+            <a:off x="385763" y="6431150"/>
             <a:ext cx="6771405" cy="246221"/>
           </a:xfrm>
           <a:prstGeom prst="rect">
@@ -22770,8 +22873,8 @@
         </p:nvSpPr>
         <p:spPr>
           <a:xfrm flipH="1">
-            <a:off x="1425195" y="2904164"/>
-            <a:ext cx="9381291" cy="769441"/>
+            <a:off x="1038158" y="3459778"/>
+            <a:ext cx="10039484" cy="369332"/>
           </a:xfrm>
           <a:prstGeom prst="rect">
             <a:avLst/>
@@ -22784,22 +22887,13 @@
           </a:bodyPr>
           <a:lstStyle/>
           <a:p>
-            <a:pPr algn="ctr"/>
             <a:r>
-              <a:rPr lang="en-US" sz="2000" dirty="0"/>
-              <a:t>Multiple models were reviewed and 3 of them met the met most of the requirements. Selected </a:t>
-            </a:r>
-            <a:r>
-              <a:rPr lang="en-US" sz="2400" b="1" dirty="0">
+              <a:rPr lang="en-US" dirty="0">
                 <a:solidFill>
-                  <a:schemeClr val="accent6"/>
+                  <a:schemeClr val="accent2"/>
                 </a:solidFill>
               </a:rPr>
-              <a:t>Logistic Regression Analysis </a:t>
-            </a:r>
-            <a:r>
-              <a:rPr lang="en-US" sz="2000" dirty="0"/>
-              <a:t>to model attrition</a:t>
+              <a:t>Evaluated Models</a:t>
             </a:r>
           </a:p>
         </p:txBody>
@@ -22818,15 +22912,15 @@
         </p:nvSpPr>
         <p:spPr>
           <a:xfrm>
-            <a:off x="1076258" y="1616197"/>
-            <a:ext cx="9730228" cy="461665"/>
+            <a:off x="462029" y="1660177"/>
+            <a:ext cx="7715184" cy="1492716"/>
           </a:xfrm>
           <a:prstGeom prst="rect">
             <a:avLst/>
           </a:prstGeom>
         </p:spPr>
         <p:txBody>
-          <a:bodyPr wrap="none">
+          <a:bodyPr wrap="square">
             <a:spAutoFit/>
           </a:bodyPr>
           <a:lstStyle/>
@@ -22834,14 +22928,164 @@
             <a:r>
               <a:rPr lang="en-US" sz="2400" dirty="0">
                 <a:solidFill>
+                  <a:schemeClr val="accent2"/>
+                </a:solidFill>
+              </a:rPr>
+              <a:t>Importance of attrition predictive model</a:t>
+            </a:r>
+          </a:p>
+          <a:p>
+            <a:endParaRPr lang="en-US" sz="800" dirty="0">
+              <a:solidFill>
+                <a:schemeClr val="accent2"/>
+              </a:solidFill>
+            </a:endParaRPr>
+          </a:p>
+          <a:p>
+            <a:pPr marL="342900" indent="-342900">
+              <a:spcAft>
+                <a:spcPts val="600"/>
+              </a:spcAft>
+              <a:buFont typeface="+mj-lt"/>
+              <a:buAutoNum type="arabicPeriod"/>
+            </a:pPr>
+            <a:r>
+              <a:rPr lang="en-US" dirty="0"/>
+              <a:t>The predictive model </a:t>
+            </a:r>
+            <a:r>
+              <a:rPr lang="en-US" b="1" dirty="0">
+                <a:solidFill>
                   <a:schemeClr val="accent6"/>
                 </a:solidFill>
               </a:rPr>
-              <a:t>Importance of a predictive model: </a:t>
+              <a:t>combines insight</a:t>
             </a:r>
             <a:r>
               <a:rPr lang="en-US" dirty="0"/>
-              <a:t>The predictive model allows to combine all the variables</a:t>
+              <a:t> from all the variables to make a more robust prediction than if using single variables</a:t>
+            </a:r>
+          </a:p>
+          <a:p>
+            <a:pPr marL="342900" indent="-342900">
+              <a:spcAft>
+                <a:spcPts val="600"/>
+              </a:spcAft>
+              <a:buFont typeface="+mj-lt"/>
+              <a:buAutoNum type="arabicPeriod"/>
+            </a:pPr>
+            <a:r>
+              <a:rPr lang="en-US" b="1" dirty="0">
+                <a:solidFill>
+                  <a:schemeClr val="accent6"/>
+                </a:solidFill>
+              </a:rPr>
+              <a:t>Identifies the most significant variables</a:t>
+            </a:r>
+            <a:r>
+              <a:rPr lang="en-US" dirty="0"/>
+              <a:t> in the context of prediction</a:t>
+            </a:r>
+          </a:p>
+        </p:txBody>
+      </p:sp>
+      <p:sp>
+        <p:nvSpPr>
+          <p:cNvPr id="7" name="Rectangle 6">
+            <a:extLst>
+              <a:ext uri="{FF2B5EF4-FFF2-40B4-BE49-F238E27FC236}">
+                <a16:creationId xmlns:a16="http://schemas.microsoft.com/office/drawing/2014/main" id="{F792BEEE-B221-4FB1-99B3-641FF7EFFA26}"/>
+              </a:ext>
+            </a:extLst>
+          </p:cNvPr>
+          <p:cNvSpPr/>
+          <p:nvPr/>
+        </p:nvSpPr>
+        <p:spPr>
+          <a:xfrm>
+            <a:off x="5711372" y="3871913"/>
+            <a:ext cx="1608592" cy="2524125"/>
+          </a:xfrm>
+          <a:prstGeom prst="rect">
+            <a:avLst/>
+          </a:prstGeom>
+          <a:solidFill>
+            <a:schemeClr val="accent6">
+              <a:lumMod val="20000"/>
+              <a:lumOff val="80000"/>
+              <a:alpha val="24000"/>
+            </a:schemeClr>
+          </a:solidFill>
+          <a:ln w="12700">
+            <a:solidFill>
+              <a:schemeClr val="accent6"/>
+            </a:solidFill>
+            <a:prstDash val="dash"/>
+          </a:ln>
+        </p:spPr>
+        <p:style>
+          <a:lnRef idx="2">
+            <a:schemeClr val="accent1">
+              <a:shade val="50000"/>
+            </a:schemeClr>
+          </a:lnRef>
+          <a:fillRef idx="1">
+            <a:schemeClr val="accent1"/>
+          </a:fillRef>
+          <a:effectRef idx="0">
+            <a:schemeClr val="accent1"/>
+          </a:effectRef>
+          <a:fontRef idx="minor">
+            <a:schemeClr val="lt1"/>
+          </a:fontRef>
+        </p:style>
+        <p:txBody>
+          <a:bodyPr rtlCol="0" anchor="ctr"/>
+          <a:lstStyle/>
+          <a:p>
+            <a:pPr algn="ctr"/>
+            <a:endParaRPr lang="en-US"/>
+          </a:p>
+        </p:txBody>
+      </p:sp>
+      <p:sp>
+        <p:nvSpPr>
+          <p:cNvPr id="8" name="TextBox 7">
+            <a:extLst>
+              <a:ext uri="{FF2B5EF4-FFF2-40B4-BE49-F238E27FC236}">
+                <a16:creationId xmlns:a16="http://schemas.microsoft.com/office/drawing/2014/main" id="{20BD4271-8C3C-4586-82EC-0BAB6F2F3255}"/>
+              </a:ext>
+            </a:extLst>
+          </p:cNvPr>
+          <p:cNvSpPr txBox="1"/>
+          <p:nvPr/>
+        </p:nvSpPr>
+        <p:spPr>
+          <a:xfrm>
+            <a:off x="5711371" y="3507959"/>
+            <a:ext cx="1608591" cy="369332"/>
+          </a:xfrm>
+          <a:prstGeom prst="rect">
+            <a:avLst/>
+          </a:prstGeom>
+          <a:solidFill>
+            <a:schemeClr val="accent6"/>
+          </a:solidFill>
+        </p:spPr>
+        <p:txBody>
+          <a:bodyPr wrap="square" rtlCol="0">
+            <a:spAutoFit/>
+          </a:bodyPr>
+          <a:lstStyle/>
+          <a:p>
+            <a:pPr algn="ctr"/>
+            <a:r>
+              <a:rPr lang="en-US" b="1" dirty="0">
+                <a:solidFill>
+                  <a:schemeClr val="bg2"/>
+                </a:solidFill>
+              </a:rPr>
+              <a:t>Selected</a:t>
             </a:r>
           </a:p>
         </p:txBody>
@@ -22856,6 +23100,213 @@
   <p:clrMapOvr>
     <a:masterClrMapping/>
   </p:clrMapOvr>
+  <p:timing>
+    <p:tnLst>
+      <p:par>
+        <p:cTn id="1" dur="indefinite" restart="never" nodeType="tmRoot">
+          <p:childTnLst>
+            <p:seq concurrent="1" nextAc="seek">
+              <p:cTn id="2" dur="indefinite" nodeType="mainSeq">
+                <p:childTnLst>
+                  <p:par>
+                    <p:cTn id="3" fill="hold">
+                      <p:stCondLst>
+                        <p:cond delay="indefinite"/>
+                      </p:stCondLst>
+                      <p:childTnLst>
+                        <p:par>
+                          <p:cTn id="4" fill="hold">
+                            <p:stCondLst>
+                              <p:cond delay="0"/>
+                            </p:stCondLst>
+                            <p:childTnLst>
+                              <p:par>
+                                <p:cTn id="5" presetID="1" presetClass="entr" presetSubtype="0" fill="hold" grpId="0" nodeType="clickEffect">
+                                  <p:stCondLst>
+                                    <p:cond delay="0"/>
+                                  </p:stCondLst>
+                                  <p:childTnLst>
+                                    <p:set>
+                                      <p:cBhvr>
+                                        <p:cTn id="6" dur="1" fill="hold">
+                                          <p:stCondLst>
+                                            <p:cond delay="0"/>
+                                          </p:stCondLst>
+                                        </p:cTn>
+                                        <p:tgtEl>
+                                          <p:spTgt spid="6"/>
+                                        </p:tgtEl>
+                                        <p:attrNameLst>
+                                          <p:attrName>style.visibility</p:attrName>
+                                        </p:attrNameLst>
+                                      </p:cBhvr>
+                                      <p:to>
+                                        <p:strVal val="visible"/>
+                                      </p:to>
+                                    </p:set>
+                                  </p:childTnLst>
+                                </p:cTn>
+                              </p:par>
+                              <p:par>
+                                <p:cTn id="7" presetID="1" presetClass="entr" presetSubtype="0" fill="hold" nodeType="withEffect">
+                                  <p:stCondLst>
+                                    <p:cond delay="0"/>
+                                  </p:stCondLst>
+                                  <p:childTnLst>
+                                    <p:set>
+                                      <p:cBhvr>
+                                        <p:cTn id="8" dur="1" fill="hold">
+                                          <p:stCondLst>
+                                            <p:cond delay="0"/>
+                                          </p:stCondLst>
+                                        </p:cTn>
+                                        <p:tgtEl>
+                                          <p:spTgt spid="4"/>
+                                        </p:tgtEl>
+                                        <p:attrNameLst>
+                                          <p:attrName>style.visibility</p:attrName>
+                                        </p:attrNameLst>
+                                      </p:cBhvr>
+                                      <p:to>
+                                        <p:strVal val="visible"/>
+                                      </p:to>
+                                    </p:set>
+                                  </p:childTnLst>
+                                </p:cTn>
+                              </p:par>
+                              <p:par>
+                                <p:cTn id="9" presetID="1" presetClass="entr" presetSubtype="0" fill="hold" grpId="0" nodeType="withEffect">
+                                  <p:stCondLst>
+                                    <p:cond delay="0"/>
+                                  </p:stCondLst>
+                                  <p:childTnLst>
+                                    <p:set>
+                                      <p:cBhvr>
+                                        <p:cTn id="10" dur="1" fill="hold">
+                                          <p:stCondLst>
+                                            <p:cond delay="0"/>
+                                          </p:stCondLst>
+                                        </p:cTn>
+                                        <p:tgtEl>
+                                          <p:spTgt spid="5"/>
+                                        </p:tgtEl>
+                                        <p:attrNameLst>
+                                          <p:attrName>style.visibility</p:attrName>
+                                        </p:attrNameLst>
+                                      </p:cBhvr>
+                                      <p:to>
+                                        <p:strVal val="visible"/>
+                                      </p:to>
+                                    </p:set>
+                                  </p:childTnLst>
+                                </p:cTn>
+                              </p:par>
+                            </p:childTnLst>
+                          </p:cTn>
+                        </p:par>
+                      </p:childTnLst>
+                    </p:cTn>
+                  </p:par>
+                  <p:par>
+                    <p:cTn id="11" fill="hold">
+                      <p:stCondLst>
+                        <p:cond delay="indefinite"/>
+                      </p:stCondLst>
+                      <p:childTnLst>
+                        <p:par>
+                          <p:cTn id="12" fill="hold">
+                            <p:stCondLst>
+                              <p:cond delay="0"/>
+                            </p:stCondLst>
+                            <p:childTnLst>
+                              <p:par>
+                                <p:cTn id="13" presetID="1" presetClass="entr" presetSubtype="0" fill="hold" grpId="0" nodeType="clickEffect">
+                                  <p:stCondLst>
+                                    <p:cond delay="0"/>
+                                  </p:stCondLst>
+                                  <p:childTnLst>
+                                    <p:set>
+                                      <p:cBhvr>
+                                        <p:cTn id="14" dur="1" fill="hold">
+                                          <p:stCondLst>
+                                            <p:cond delay="0"/>
+                                          </p:stCondLst>
+                                        </p:cTn>
+                                        <p:tgtEl>
+                                          <p:spTgt spid="8"/>
+                                        </p:tgtEl>
+                                        <p:attrNameLst>
+                                          <p:attrName>style.visibility</p:attrName>
+                                        </p:attrNameLst>
+                                      </p:cBhvr>
+                                      <p:to>
+                                        <p:strVal val="visible"/>
+                                      </p:to>
+                                    </p:set>
+                                  </p:childTnLst>
+                                </p:cTn>
+                              </p:par>
+                              <p:par>
+                                <p:cTn id="15" presetID="1" presetClass="entr" presetSubtype="0" fill="hold" grpId="0" nodeType="withEffect">
+                                  <p:stCondLst>
+                                    <p:cond delay="0"/>
+                                  </p:stCondLst>
+                                  <p:childTnLst>
+                                    <p:set>
+                                      <p:cBhvr>
+                                        <p:cTn id="16" dur="1" fill="hold">
+                                          <p:stCondLst>
+                                            <p:cond delay="0"/>
+                                          </p:stCondLst>
+                                        </p:cTn>
+                                        <p:tgtEl>
+                                          <p:spTgt spid="7"/>
+                                        </p:tgtEl>
+                                        <p:attrNameLst>
+                                          <p:attrName>style.visibility</p:attrName>
+                                        </p:attrNameLst>
+                                      </p:cBhvr>
+                                      <p:to>
+                                        <p:strVal val="visible"/>
+                                      </p:to>
+                                    </p:set>
+                                  </p:childTnLst>
+                                </p:cTn>
+                              </p:par>
+                            </p:childTnLst>
+                          </p:cTn>
+                        </p:par>
+                      </p:childTnLst>
+                    </p:cTn>
+                  </p:par>
+                </p:childTnLst>
+              </p:cTn>
+              <p:prevCondLst>
+                <p:cond evt="onPrev" delay="0">
+                  <p:tgtEl>
+                    <p:sldTgt/>
+                  </p:tgtEl>
+                </p:cond>
+              </p:prevCondLst>
+              <p:nextCondLst>
+                <p:cond evt="onNext" delay="0">
+                  <p:tgtEl>
+                    <p:sldTgt/>
+                  </p:tgtEl>
+                </p:cond>
+              </p:nextCondLst>
+            </p:seq>
+          </p:childTnLst>
+        </p:cTn>
+      </p:par>
+    </p:tnLst>
+    <p:bldLst>
+      <p:bldP spid="5" grpId="0"/>
+      <p:bldP spid="6" grpId="0"/>
+      <p:bldP spid="7" grpId="0" animBg="1"/>
+      <p:bldP spid="8" grpId="0" animBg="1"/>
+    </p:bldLst>
+  </p:timing>
 </p:sld>
 </file>
 

</xml_diff>